<commit_message>
fixed skates type on each page
</commit_message>
<xml_diff>
--- a/assets/Project#2.pptx
+++ b/assets/Project#2.pptx
@@ -1392,7 +1392,7 @@
   <p:cSld>
     <p:spTree>
       <p:nvGrpSpPr>
-        <p:cNvPr id="96" name="Shape 96"/>
+        <p:cNvPr id="97" name="Shape 97"/>
         <p:cNvGrpSpPr/>
         <p:nvPr/>
       </p:nvGrpSpPr>
@@ -1406,7 +1406,7 @@
       </p:grpSpPr>
       <p:sp>
         <p:nvSpPr>
-          <p:cNvPr id="97" name="Google Shape;97;g11866ebccae_1_56:notes"/>
+          <p:cNvPr id="98" name="Google Shape;98;g11866ebccae_1_56:notes"/>
           <p:cNvSpPr/>
           <p:nvPr>
             <p:ph idx="2" type="sldImg"/>
@@ -1441,7 +1441,7 @@
       </p:sp>
       <p:sp>
         <p:nvSpPr>
-          <p:cNvPr id="98" name="Google Shape;98;g11866ebccae_1_56:notes"/>
+          <p:cNvPr id="99" name="Google Shape;99;g11866ebccae_1_56:notes"/>
           <p:cNvSpPr txBox="1"/>
           <p:nvPr>
             <p:ph idx="1" type="body"/>
@@ -1491,7 +1491,7 @@
   <p:cSld>
     <p:spTree>
       <p:nvGrpSpPr>
-        <p:cNvPr id="102" name="Shape 102"/>
+        <p:cNvPr id="103" name="Shape 103"/>
         <p:cNvGrpSpPr/>
         <p:nvPr/>
       </p:nvGrpSpPr>
@@ -1505,7 +1505,7 @@
       </p:grpSpPr>
       <p:sp>
         <p:nvSpPr>
-          <p:cNvPr id="103" name="Google Shape;103;g11866ebccae_1_61:notes"/>
+          <p:cNvPr id="104" name="Google Shape;104;g11866ebccae_1_61:notes"/>
           <p:cNvSpPr/>
           <p:nvPr>
             <p:ph idx="2" type="sldImg"/>
@@ -1540,7 +1540,7 @@
       </p:sp>
       <p:sp>
         <p:nvSpPr>
-          <p:cNvPr id="104" name="Google Shape;104;g11866ebccae_1_61:notes"/>
+          <p:cNvPr id="105" name="Google Shape;105;g11866ebccae_1_61:notes"/>
           <p:cNvSpPr txBox="1"/>
           <p:nvPr>
             <p:ph idx="1" type="body"/>
@@ -7056,35 +7056,7 @@
                   <a:schemeClr val="dk2"/>
                 </a:solidFill>
               </a:rPr>
-              <a:t>WHEN I create a post, THEN I can select the type of skates I rented;</a:t>
-            </a:r>
-            <a:endParaRPr sz="1500">
-              <a:solidFill>
-                <a:schemeClr val="dk2"/>
-              </a:solidFill>
-            </a:endParaRPr>
-          </a:p>
-          <a:p>
-            <a:pPr indent="-323850" lvl="0" marL="457200" rtl="0" algn="l">
-              <a:spcBef>
-                <a:spcPts val="0"/>
-              </a:spcBef>
-              <a:spcAft>
-                <a:spcPts val="0"/>
-              </a:spcAft>
-              <a:buClr>
-                <a:schemeClr val="dk2"/>
-              </a:buClr>
-              <a:buSzPts val="1500"/>
-              <a:buChar char="●"/>
-            </a:pPr>
-            <a:r>
-              <a:rPr lang="en" sz="1500">
-                <a:solidFill>
-                  <a:schemeClr val="dk2"/>
-                </a:solidFill>
-              </a:rPr>
-              <a:t>WHEN I create a post, THEN I can select my level of skating proficiency.</a:t>
+              <a:t>WHEN I create a post, THEN I can select the type of skates I rented.</a:t>
             </a:r>
             <a:endParaRPr sz="1500">
               <a:solidFill>
@@ -8724,14 +8696,14 @@
               <a:buNone/>
             </a:pPr>
             <a:r>
-              <a:rPr lang="en" sz="2000">
+              <a:rPr lang="en" sz="1900">
                 <a:solidFill>
                   <a:schemeClr val="dk2"/>
                 </a:solidFill>
               </a:rPr>
               <a:t>We came together and got it done!</a:t>
             </a:r>
-            <a:endParaRPr sz="2000">
+            <a:endParaRPr sz="1900">
               <a:solidFill>
                 <a:schemeClr val="dk2"/>
               </a:solidFill>
@@ -8750,7 +8722,7 @@
             <a:r>
               <a:t/>
             </a:r>
-            <a:endParaRPr sz="2000">
+            <a:endParaRPr sz="1900">
               <a:solidFill>
                 <a:schemeClr val="dk2"/>
               </a:solidFill>
@@ -8767,14 +8739,14 @@
               <a:buNone/>
             </a:pPr>
             <a:r>
-              <a:rPr lang="en" sz="2000">
+              <a:rPr lang="en" sz="1900">
                 <a:solidFill>
                   <a:schemeClr val="dk2"/>
                 </a:solidFill>
               </a:rPr>
               <a:t>We helped each other with the re-installation of MySQL.</a:t>
             </a:r>
-            <a:endParaRPr sz="2000">
+            <a:endParaRPr sz="1900">
               <a:solidFill>
                 <a:schemeClr val="dk2"/>
               </a:solidFill>
@@ -8793,7 +8765,7 @@
             <a:r>
               <a:t/>
             </a:r>
-            <a:endParaRPr sz="2000">
+            <a:endParaRPr sz="1900">
               <a:solidFill>
                 <a:schemeClr val="dk2"/>
               </a:solidFill>
@@ -8810,14 +8782,14 @@
               <a:buNone/>
             </a:pPr>
             <a:r>
-              <a:rPr lang="en" sz="2000">
+              <a:rPr lang="en" sz="1900">
                 <a:solidFill>
                   <a:schemeClr val="dk2"/>
                 </a:solidFill>
               </a:rPr>
               <a:t>We figured out 4 tables was sufficient and more efficient.</a:t>
             </a:r>
-            <a:endParaRPr sz="2000">
+            <a:endParaRPr sz="1900">
               <a:solidFill>
                 <a:schemeClr val="dk2"/>
               </a:solidFill>
@@ -8836,7 +8808,7 @@
             <a:r>
               <a:t/>
             </a:r>
-            <a:endParaRPr sz="2000">
+            <a:endParaRPr sz="1900">
               <a:solidFill>
                 <a:schemeClr val="dk2"/>
               </a:solidFill>
@@ -8853,14 +8825,14 @@
               <a:buNone/>
             </a:pPr>
             <a:r>
-              <a:rPr lang="en" sz="2000">
+              <a:rPr lang="en" sz="1900">
                 <a:solidFill>
                   <a:schemeClr val="dk2"/>
                 </a:solidFill>
               </a:rPr>
-              <a:t>Trial and error is now our second nature :)</a:t>
-            </a:r>
-            <a:endParaRPr sz="2000">
+              <a:t>We succeeded with trial and error (and help from Gabe!)</a:t>
+            </a:r>
+            <a:endParaRPr sz="1900">
               <a:solidFill>
                 <a:schemeClr val="dk2"/>
               </a:solidFill>
@@ -9649,7 +9621,7 @@
         </p:nvSpPr>
         <p:spPr>
           <a:xfrm flipH="1">
-            <a:off x="2088925" y="1930850"/>
+            <a:off x="2088925" y="1549850"/>
             <a:ext cx="4774800" cy="940200"/>
           </a:xfrm>
           <a:prstGeom prst="roundRect">
@@ -9697,6 +9669,69 @@
           </a:p>
         </p:txBody>
       </p:sp>
+      <p:sp>
+        <p:nvSpPr>
+          <p:cNvPr id="96" name="Google Shape;96;p19"/>
+          <p:cNvSpPr/>
+          <p:nvPr/>
+        </p:nvSpPr>
+        <p:spPr>
+          <a:xfrm flipH="1">
+            <a:off x="1311750" y="3070200"/>
+            <a:ext cx="6499800" cy="940200"/>
+          </a:xfrm>
+          <a:prstGeom prst="roundRect">
+            <a:avLst>
+              <a:gd fmla="val 16667" name="adj"/>
+            </a:avLst>
+          </a:prstGeom>
+          <a:solidFill>
+            <a:srgbClr val="CFE2F3"/>
+          </a:solidFill>
+          <a:ln cap="flat" cmpd="sng" w="9525">
+            <a:solidFill>
+              <a:schemeClr val="dk2"/>
+            </a:solidFill>
+            <a:prstDash val="solid"/>
+            <a:round/>
+            <a:headEnd len="sm" w="sm" type="none"/>
+            <a:tailEnd len="sm" w="sm" type="none"/>
+          </a:ln>
+        </p:spPr>
+        <p:txBody>
+          <a:bodyPr anchorCtr="0" anchor="ctr" bIns="91425" lIns="91425" spcFirstLastPara="1" rIns="91425" wrap="square" tIns="91425">
+            <a:noAutofit/>
+          </a:bodyPr>
+          <a:lstStyle/>
+          <a:p>
+            <a:pPr indent="0" lvl="0" marL="0" rtl="0" algn="l">
+              <a:spcBef>
+                <a:spcPts val="0"/>
+              </a:spcBef>
+              <a:spcAft>
+                <a:spcPts val="0"/>
+              </a:spcAft>
+              <a:buNone/>
+            </a:pPr>
+            <a:r>
+              <a:rPr lang="en" sz="2700" u="sng">
+                <a:solidFill>
+                  <a:schemeClr val="accent5"/>
+                </a:solidFill>
+                <a:hlinkClick r:id="rId3">
+                  <a:extLst>
+                    <a:ext uri="{A12FA001-AC4F-418D-AE19-62706E023703}">
+                      <ahyp:hlinkClr val="tx"/>
+                    </a:ext>
+                  </a:extLst>
+                </a:hlinkClick>
+              </a:rPr>
+              <a:t>https://lord-of-the-rinks.herokuapp.com/</a:t>
+            </a:r>
+            <a:endParaRPr sz="1200"/>
+          </a:p>
+        </p:txBody>
+      </p:sp>
     </p:spTree>
   </p:cSld>
   <p:clrMapOvr>
@@ -9717,7 +9752,7 @@
     </p:bg>
     <p:spTree>
       <p:nvGrpSpPr>
-        <p:cNvPr id="99" name="Shape 99"/>
+        <p:cNvPr id="100" name="Shape 100"/>
         <p:cNvGrpSpPr/>
         <p:nvPr/>
       </p:nvGrpSpPr>
@@ -9731,7 +9766,7 @@
       </p:grpSpPr>
       <p:sp>
         <p:nvSpPr>
-          <p:cNvPr id="100" name="Google Shape;100;p20"/>
+          <p:cNvPr id="101" name="Google Shape;101;p20"/>
           <p:cNvSpPr/>
           <p:nvPr/>
         </p:nvSpPr>
@@ -9787,7 +9822,7 @@
       </p:sp>
       <p:sp>
         <p:nvSpPr>
-          <p:cNvPr id="101" name="Google Shape;101;p20"/>
+          <p:cNvPr id="102" name="Google Shape;102;p20"/>
           <p:cNvSpPr/>
           <p:nvPr/>
         </p:nvSpPr>
@@ -9820,7 +9855,7 @@
           </a:bodyPr>
           <a:lstStyle/>
           <a:p>
-            <a:pPr indent="-323850" lvl="0" marL="457200" rtl="0" algn="l">
+            <a:pPr indent="-342900" lvl="0" marL="457200" rtl="0" algn="l">
               <a:spcBef>
                 <a:spcPts val="0"/>
               </a:spcBef>
@@ -9830,25 +9865,41 @@
               <a:buClr>
                 <a:schemeClr val="dk2"/>
               </a:buClr>
-              <a:buSzPts val="1500"/>
+              <a:buSzPts val="1800"/>
               <a:buChar char="●"/>
             </a:pPr>
             <a:r>
-              <a:rPr lang="en" sz="1500">
+              <a:rPr lang="en" sz="1800">
                 <a:solidFill>
                   <a:schemeClr val="dk2"/>
                 </a:solidFill>
               </a:rPr>
-              <a:t>Add content analysis module to mine post data so that National Capital Commission (NCC; responsible for Canal) can improve the overall experience of skating on the Canal.</a:t>
-            </a:r>
-            <a:endParaRPr sz="1500">
+              <a:t>Enhance user experience by adding other options to select besides types of skates used, like level of </a:t>
+            </a:r>
+            <a:r>
+              <a:rPr lang="en" sz="1800">
+                <a:solidFill>
+                  <a:schemeClr val="dk2"/>
+                </a:solidFill>
+              </a:rPr>
+              <a:t>proficiency</a:t>
+            </a:r>
+            <a:r>
+              <a:rPr lang="en" sz="1800">
+                <a:solidFill>
+                  <a:schemeClr val="dk2"/>
+                </a:solidFill>
+              </a:rPr>
+              <a:t>, where you are from, etc.</a:t>
+            </a:r>
+            <a:endParaRPr sz="1800">
               <a:solidFill>
                 <a:schemeClr val="dk2"/>
               </a:solidFill>
             </a:endParaRPr>
           </a:p>
           <a:p>
-            <a:pPr indent="-323850" lvl="0" marL="457200" rtl="0" algn="l">
+            <a:pPr indent="-342900" lvl="0" marL="457200" rtl="0" algn="l">
               <a:spcBef>
                 <a:spcPts val="0"/>
               </a:spcBef>
@@ -9858,18 +9909,46 @@
               <a:buClr>
                 <a:schemeClr val="dk2"/>
               </a:buClr>
-              <a:buSzPts val="1500"/>
+              <a:buSzPts val="1800"/>
               <a:buChar char="●"/>
             </a:pPr>
             <a:r>
-              <a:rPr lang="en" sz="1500">
+              <a:rPr lang="en" sz="1800">
                 <a:solidFill>
                   <a:schemeClr val="dk2"/>
                 </a:solidFill>
               </a:rPr>
-              <a:t>Add an administrator Dashboard from where content analysis can be run and results can be reviewed.</a:t>
-            </a:r>
-            <a:endParaRPr sz="1500">
+              <a:t>Add content analysis module to mine post data so that National Capital Commission (NCC; responsible for Canal) can improve the overall experience of skating on the Canal.</a:t>
+            </a:r>
+            <a:endParaRPr sz="1800">
+              <a:solidFill>
+                <a:schemeClr val="dk2"/>
+              </a:solidFill>
+            </a:endParaRPr>
+          </a:p>
+          <a:p>
+            <a:pPr indent="-342900" lvl="0" marL="457200" rtl="0" algn="l">
+              <a:spcBef>
+                <a:spcPts val="0"/>
+              </a:spcBef>
+              <a:spcAft>
+                <a:spcPts val="0"/>
+              </a:spcAft>
+              <a:buClr>
+                <a:schemeClr val="dk2"/>
+              </a:buClr>
+              <a:buSzPts val="1800"/>
+              <a:buChar char="●"/>
+            </a:pPr>
+            <a:r>
+              <a:rPr lang="en" sz="1800">
+                <a:solidFill>
+                  <a:schemeClr val="dk2"/>
+                </a:solidFill>
+              </a:rPr>
+              <a:t>Add an administrator Dashboard from where content can be moderated, content analysis can be run, results can be reviewed and shared with the community.</a:t>
+            </a:r>
+            <a:endParaRPr sz="1800">
               <a:solidFill>
                 <a:schemeClr val="dk2"/>
               </a:solidFill>
@@ -9897,7 +9976,7 @@
     </p:bg>
     <p:spTree>
       <p:nvGrpSpPr>
-        <p:cNvPr id="105" name="Shape 105"/>
+        <p:cNvPr id="106" name="Shape 106"/>
         <p:cNvGrpSpPr/>
         <p:nvPr/>
       </p:nvGrpSpPr>
@@ -9911,7 +9990,7 @@
       </p:grpSpPr>
       <p:sp>
         <p:nvSpPr>
-          <p:cNvPr id="106" name="Google Shape;106;p21"/>
+          <p:cNvPr id="107" name="Google Shape;107;p21"/>
           <p:cNvSpPr/>
           <p:nvPr/>
         </p:nvSpPr>
@@ -9967,7 +10046,7 @@
       </p:sp>
       <p:sp>
         <p:nvSpPr>
-          <p:cNvPr id="107" name="Google Shape;107;p21"/>
+          <p:cNvPr id="108" name="Google Shape;108;p21"/>
           <p:cNvSpPr/>
           <p:nvPr/>
         </p:nvSpPr>

</xml_diff>